<commit_message>
Add link for Adafruit Budget Pack
</commit_message>
<xml_diff>
--- a/ArduinoWorkshop1.pptx
+++ b/ArduinoWorkshop1.pptx
@@ -4128,11 +4128,7 @@
           <a:p>
             <a:r>
               <a:rPr lang="en-US" dirty="0" smtClean="0"/>
-              <a:t>Basic </a:t>
-            </a:r>
-            <a:r>
-              <a:rPr lang="en-US" dirty="0" smtClean="0"/>
-              <a:t>Concepts - Videos</a:t>
+              <a:t>Basic Concepts - Videos</a:t>
             </a:r>
             <a:endParaRPr lang="en-US" dirty="0"/>
           </a:p>
@@ -4178,9 +4174,6 @@
               </a:rPr>
               <a:t>https://www.youtube.com/watch?v=l8JS8BbrVOg</a:t>
             </a:r>
-            <a:endParaRPr lang="en-US" sz="4800" u="sng" dirty="0">
-              <a:hlinkClick r:id="rId2"/>
-            </a:endParaRPr>
           </a:p>
           <a:p>
             <a:pPr marL="0" indent="0">
@@ -4198,9 +4191,6 @@
               </a:rPr>
               <a:t>://www.youtube.com/watch?v=8gvJzrjwjds</a:t>
             </a:r>
-            <a:endParaRPr lang="en-US" sz="4800" u="sng" dirty="0">
-              <a:hlinkClick r:id="rId3"/>
-            </a:endParaRPr>
           </a:p>
           <a:p>
             <a:pPr marL="0" indent="0">
@@ -4218,9 +4208,6 @@
               </a:rPr>
               <a:t>://www.youtube.com/watch?v=exlRjDKHGRg</a:t>
             </a:r>
-            <a:endParaRPr lang="en-US" sz="4800" u="sng" dirty="0">
-              <a:hlinkClick r:id="rId4"/>
-            </a:endParaRPr>
           </a:p>
           <a:p>
             <a:pPr marL="0" indent="0">
@@ -4238,9 +4225,6 @@
               </a:rPr>
               <a:t>://www.youtube.com/watch?v=mzSnz6ZDkFE</a:t>
             </a:r>
-            <a:endParaRPr lang="en-US" sz="4800" u="sng" dirty="0">
-              <a:hlinkClick r:id="rId5"/>
-            </a:endParaRPr>
           </a:p>
           <a:p>
             <a:endParaRPr lang="en-US" sz="4800" dirty="0"/>
@@ -4265,9 +4249,6 @@
               </a:rPr>
               <a:t>https://www.youtube.com/watch?v=VPVoY1QROMg</a:t>
             </a:r>
-            <a:endParaRPr lang="en-US" sz="4800" u="sng" dirty="0">
-              <a:hlinkClick r:id="rId6"/>
-            </a:endParaRPr>
           </a:p>
           <a:p>
             <a:pPr marL="0" indent="0">
@@ -4333,9 +4314,6 @@
               </a:rPr>
               <a:t>https://www.youtube.com/watch?v=ap7edIKkykA</a:t>
             </a:r>
-            <a:endParaRPr lang="en-US" sz="4800" u="sng" dirty="0">
-              <a:hlinkClick r:id="rId9"/>
-            </a:endParaRPr>
           </a:p>
           <a:p>
             <a:pPr marL="0" indent="0">
@@ -4371,9 +4349,6 @@
               </a:rPr>
               <a:t>https://www.youtube.com/watch?v=WoN1nou5t1Q</a:t>
             </a:r>
-            <a:endParaRPr lang="en-US" sz="4800" u="sng" dirty="0">
-              <a:hlinkClick r:id="rId10"/>
-            </a:endParaRPr>
           </a:p>
           <a:p>
             <a:pPr marL="0" indent="0">
@@ -4391,9 +4366,6 @@
               </a:rPr>
               <a:t>://www.youtube.com/watch?v=zYS9kdS56l8</a:t>
             </a:r>
-            <a:endParaRPr lang="en-US" sz="4800" u="sng" dirty="0">
-              <a:hlinkClick r:id="rId11"/>
-            </a:endParaRPr>
           </a:p>
           <a:p>
             <a:pPr marL="0" indent="0">
@@ -4411,9 +4383,6 @@
               </a:rPr>
               <a:t>://www.youtube.com/watch?v=zYS9kdS56l8</a:t>
             </a:r>
-            <a:endParaRPr lang="en-US" sz="4800" u="sng" dirty="0">
-              <a:hlinkClick r:id="rId11"/>
-            </a:endParaRPr>
           </a:p>
           <a:p>
             <a:pPr marL="0" indent="0">
@@ -4431,9 +4400,6 @@
               </a:rPr>
               <a:t>://www.youtube.com/watch?v=6Zxp8lSdn8M</a:t>
             </a:r>
-            <a:endParaRPr lang="en-US" sz="4800" u="sng" dirty="0">
-              <a:hlinkClick r:id="rId12"/>
-            </a:endParaRPr>
           </a:p>
           <a:p>
             <a:pPr marL="0" indent="0">
@@ -5631,13 +5597,7 @@
               <a:rPr lang="en-US" sz="2000" dirty="0" smtClean="0">
                 <a:cs typeface="American Typewriter"/>
               </a:rPr>
-              <a:t>					</a:t>
-            </a:r>
-            <a:r>
-              <a:rPr lang="en-US" sz="2000" dirty="0" smtClean="0">
-                <a:cs typeface="American Typewriter"/>
-              </a:rPr>
-              <a:t>Download Project 3 sketch from </a:t>
+              <a:t>					Download Project 3 sketch from </a:t>
             </a:r>
             <a:r>
               <a:rPr lang="en-US" sz="2000" dirty="0" err="1" smtClean="0">
@@ -6592,7 +6552,6 @@
               <a:rPr lang="en-US" dirty="0" smtClean="0"/>
               <a:t>Write a research report on PWM (Pulse Width Modulation)</a:t>
             </a:r>
-            <a:endParaRPr lang="en-US" dirty="0" smtClean="0"/>
           </a:p>
         </p:txBody>
       </p:sp>
@@ -7021,7 +6980,6 @@
               <a:rPr lang="en-US" dirty="0"/>
               <a:t>-won-and-why-its-here-to-stay/</a:t>
             </a:r>
-            <a:endParaRPr lang="en-US" dirty="0"/>
           </a:p>
         </p:txBody>
       </p:sp>
@@ -7225,19 +7183,45 @@
           <a:bodyPr/>
           <a:lstStyle/>
           <a:p>
-            <a:endParaRPr lang="en-US" dirty="0" smtClean="0"/>
-          </a:p>
-          <a:p>
             <a:r>
               <a:rPr lang="en-US" dirty="0" err="1" smtClean="0"/>
               <a:t>Arduino</a:t>
             </a:r>
             <a:r>
               <a:rPr lang="en-US" dirty="0" smtClean="0"/>
-              <a:t> Budget Pack or equivalent</a:t>
-            </a:r>
-          </a:p>
-          <a:p>
+              <a:t> </a:t>
+            </a:r>
+            <a:r>
+              <a:rPr lang="en-US" dirty="0" smtClean="0"/>
+              <a:t>Budget Pack </a:t>
+            </a:r>
+            <a:r>
+              <a:rPr lang="en-US" dirty="0"/>
+              <a:t>(</a:t>
+            </a:r>
+            <a:r>
+              <a:rPr lang="en-US" dirty="0">
+                <a:hlinkClick r:id="rId2"/>
+              </a:rPr>
+              <a:t>https://www.adafruit.com/product/</a:t>
+            </a:r>
+            <a:r>
+              <a:rPr lang="en-US" dirty="0" smtClean="0">
+                <a:hlinkClick r:id="rId2"/>
+              </a:rPr>
+              <a:t>193</a:t>
+            </a:r>
+            <a:r>
+              <a:rPr lang="en-US" dirty="0" smtClean="0"/>
+              <a:t>) or </a:t>
+            </a:r>
+            <a:r>
+              <a:rPr lang="en-US" dirty="0" smtClean="0"/>
+              <a:t>equivalent</a:t>
+            </a:r>
+            <a:br>
+              <a:rPr lang="en-US" dirty="0" smtClean="0"/>
+            </a:br>
             <a:endParaRPr lang="en-US" dirty="0" smtClean="0"/>
           </a:p>
           <a:p>

</xml_diff>

<commit_message>
Add link for ArduinoClassRoom.com
</commit_message>
<xml_diff>
--- a/ArduinoWorkshop1.pptx
+++ b/ArduinoWorkshop1.pptx
@@ -6695,8 +6695,31 @@
               <a:rPr lang="en-US" dirty="0">
                 <a:hlinkClick r:id="rId2"/>
               </a:rPr>
-              <a:t>http://arduino.cc/en/Tutorial/HomePage</a:t>
-            </a:r>
+              <a:t>http://arduino.cc/en/Tutorial/</a:t>
+            </a:r>
+            <a:r>
+              <a:rPr lang="en-US" dirty="0" smtClean="0">
+                <a:hlinkClick r:id="rId2"/>
+              </a:rPr>
+              <a:t>HomePage</a:t>
+            </a:r>
+          </a:p>
+          <a:p>
+            <a:r>
+              <a:rPr lang="en-US" dirty="0">
+                <a:hlinkClick r:id="rId2"/>
+              </a:rPr>
+              <a:t>http://</a:t>
+            </a:r>
+            <a:r>
+              <a:rPr lang="en-US">
+                <a:hlinkClick r:id="rId2"/>
+              </a:rPr>
+              <a:t>www.arduinoclassroom.com</a:t>
+            </a:r>
+            <a:endParaRPr lang="en-US" dirty="0">
+              <a:hlinkClick r:id="rId2"/>
+            </a:endParaRPr>
           </a:p>
           <a:p>
             <a:endParaRPr lang="en-US" dirty="0" smtClean="0"/>
@@ -7189,11 +7212,7 @@
             </a:r>
             <a:r>
               <a:rPr lang="en-US" dirty="0" smtClean="0"/>
-              <a:t> </a:t>
-            </a:r>
-            <a:r>
-              <a:rPr lang="en-US" dirty="0" smtClean="0"/>
-              <a:t>Budget Pack </a:t>
+              <a:t> Budget Pack </a:t>
             </a:r>
             <a:r>
               <a:rPr lang="en-US" dirty="0"/>
@@ -7213,11 +7232,7 @@
             </a:r>
             <a:r>
               <a:rPr lang="en-US" dirty="0" smtClean="0"/>
-              <a:t>) or </a:t>
-            </a:r>
-            <a:r>
-              <a:rPr lang="en-US" dirty="0" smtClean="0"/>
-              <a:t>equivalent</a:t>
+              <a:t>) or equivalent</a:t>
             </a:r>
             <a:br>
               <a:rPr lang="en-US" dirty="0" smtClean="0"/>

</xml_diff>

<commit_message>
Fix errors in Fritzing diagrams
Fix ground connections. Add clarity to LED connections.
</commit_message>
<xml_diff>
--- a/ArduinoWorkshop1.pptx
+++ b/ArduinoWorkshop1.pptx
@@ -328,7 +328,7 @@
           <a:p>
             <a:fld id="{D0B4F1CB-6B57-EC4D-8BF2-94285296537A}" type="datetimeFigureOut">
               <a:rPr lang="en-US" smtClean="0"/>
-              <a:t>7/12/14</a:t>
+              <a:t>7/20/14</a:t>
             </a:fld>
             <a:endParaRPr lang="en-US"/>
           </a:p>
@@ -498,7 +498,7 @@
           <a:p>
             <a:fld id="{D0B4F1CB-6B57-EC4D-8BF2-94285296537A}" type="datetimeFigureOut">
               <a:rPr lang="en-US" smtClean="0"/>
-              <a:t>7/12/14</a:t>
+              <a:t>7/20/14</a:t>
             </a:fld>
             <a:endParaRPr lang="en-US"/>
           </a:p>
@@ -678,7 +678,7 @@
           <a:p>
             <a:fld id="{D0B4F1CB-6B57-EC4D-8BF2-94285296537A}" type="datetimeFigureOut">
               <a:rPr lang="en-US" smtClean="0"/>
-              <a:t>7/12/14</a:t>
+              <a:t>7/20/14</a:t>
             </a:fld>
             <a:endParaRPr lang="en-US"/>
           </a:p>
@@ -848,7 +848,7 @@
           <a:p>
             <a:fld id="{D0B4F1CB-6B57-EC4D-8BF2-94285296537A}" type="datetimeFigureOut">
               <a:rPr lang="en-US" smtClean="0"/>
-              <a:t>7/12/14</a:t>
+              <a:t>7/20/14</a:t>
             </a:fld>
             <a:endParaRPr lang="en-US"/>
           </a:p>
@@ -1094,7 +1094,7 @@
           <a:p>
             <a:fld id="{D0B4F1CB-6B57-EC4D-8BF2-94285296537A}" type="datetimeFigureOut">
               <a:rPr lang="en-US" smtClean="0"/>
-              <a:t>7/12/14</a:t>
+              <a:t>7/20/14</a:t>
             </a:fld>
             <a:endParaRPr lang="en-US"/>
           </a:p>
@@ -1382,7 +1382,7 @@
           <a:p>
             <a:fld id="{D0B4F1CB-6B57-EC4D-8BF2-94285296537A}" type="datetimeFigureOut">
               <a:rPr lang="en-US" smtClean="0"/>
-              <a:t>7/12/14</a:t>
+              <a:t>7/20/14</a:t>
             </a:fld>
             <a:endParaRPr lang="en-US"/>
           </a:p>
@@ -1804,7 +1804,7 @@
           <a:p>
             <a:fld id="{D0B4F1CB-6B57-EC4D-8BF2-94285296537A}" type="datetimeFigureOut">
               <a:rPr lang="en-US" smtClean="0"/>
-              <a:t>7/12/14</a:t>
+              <a:t>7/20/14</a:t>
             </a:fld>
             <a:endParaRPr lang="en-US"/>
           </a:p>
@@ -1922,7 +1922,7 @@
           <a:p>
             <a:fld id="{D0B4F1CB-6B57-EC4D-8BF2-94285296537A}" type="datetimeFigureOut">
               <a:rPr lang="en-US" smtClean="0"/>
-              <a:t>7/12/14</a:t>
+              <a:t>7/20/14</a:t>
             </a:fld>
             <a:endParaRPr lang="en-US"/>
           </a:p>
@@ -2017,7 +2017,7 @@
           <a:p>
             <a:fld id="{D0B4F1CB-6B57-EC4D-8BF2-94285296537A}" type="datetimeFigureOut">
               <a:rPr lang="en-US" smtClean="0"/>
-              <a:t>7/12/14</a:t>
+              <a:t>7/20/14</a:t>
             </a:fld>
             <a:endParaRPr lang="en-US"/>
           </a:p>
@@ -2294,7 +2294,7 @@
           <a:p>
             <a:fld id="{D0B4F1CB-6B57-EC4D-8BF2-94285296537A}" type="datetimeFigureOut">
               <a:rPr lang="en-US" smtClean="0"/>
-              <a:t>7/12/14</a:t>
+              <a:t>7/20/14</a:t>
             </a:fld>
             <a:endParaRPr lang="en-US"/>
           </a:p>
@@ -2547,7 +2547,7 @@
           <a:p>
             <a:fld id="{D0B4F1CB-6B57-EC4D-8BF2-94285296537A}" type="datetimeFigureOut">
               <a:rPr lang="en-US" smtClean="0"/>
-              <a:t>7/12/14</a:t>
+              <a:t>7/20/14</a:t>
             </a:fld>
             <a:endParaRPr lang="en-US"/>
           </a:p>
@@ -2760,7 +2760,7 @@
           <a:p>
             <a:fld id="{D0B4F1CB-6B57-EC4D-8BF2-94285296537A}" type="datetimeFigureOut">
               <a:rPr lang="en-US" smtClean="0"/>
-              <a:t>7/12/14</a:t>
+              <a:t>7/20/14</a:t>
             </a:fld>
             <a:endParaRPr lang="en-US"/>
           </a:p>
@@ -5048,9 +5048,10 @@
           <a:lstStyle/>
           <a:p>
             <a:r>
-              <a:rPr lang="en-US" dirty="0" smtClean="0"/>
-              <a:t>Start your laptop</a:t>
-            </a:r>
+              <a:rPr lang="en-US" smtClean="0"/>
+              <a:t>Turn your laptop on.</a:t>
+            </a:r>
+            <a:endParaRPr lang="en-US" dirty="0" smtClean="0"/>
           </a:p>
           <a:p>
             <a:endParaRPr lang="en-US" dirty="0"/>
@@ -5810,7 +5811,7 @@
       </p:sp>
       <p:pic>
         <p:nvPicPr>
-          <p:cNvPr id="4" name="Content Placeholder 3" descr="Project2A.png"/>
+          <p:cNvPr id="5" name="Content Placeholder 4" descr="Project2.png"/>
           <p:cNvPicPr>
             <a:picLocks noGrp="1" noChangeAspect="1"/>
           </p:cNvPicPr>
@@ -5826,7 +5827,7 @@
               </a:ext>
             </a:extLst>
           </a:blip>
-          <a:srcRect l="-80079" r="-80079"/>
+          <a:srcRect l="-49080" r="-49080"/>
           <a:stretch>
             <a:fillRect/>
           </a:stretch>
@@ -6077,7 +6078,7 @@
       </p:sp>
       <p:pic>
         <p:nvPicPr>
-          <p:cNvPr id="4" name="Content Placeholder 3" descr="Project3.png"/>
+          <p:cNvPr id="5" name="Content Placeholder 4" descr="Project3.png"/>
           <p:cNvPicPr>
             <a:picLocks noGrp="1" noChangeAspect="1"/>
           </p:cNvPicPr>
@@ -6093,7 +6094,7 @@
               </a:ext>
             </a:extLst>
           </a:blip>
-          <a:srcRect l="-44265" r="-44265"/>
+          <a:srcRect l="-44930" r="-44930"/>
           <a:stretch>
             <a:fillRect/>
           </a:stretch>
@@ -6294,7 +6295,7 @@
       </p:sp>
       <p:pic>
         <p:nvPicPr>
-          <p:cNvPr id="6" name="Content Placeholder 5" descr="Project4.png"/>
+          <p:cNvPr id="7" name="Content Placeholder 6" descr="Project4.png"/>
           <p:cNvPicPr>
             <a:picLocks noGrp="1" noChangeAspect="1"/>
           </p:cNvPicPr>
@@ -6310,7 +6311,7 @@
               </a:ext>
             </a:extLst>
           </a:blip>
-          <a:srcRect l="-16563" r="-16563"/>
+          <a:srcRect l="-13062" r="-13062"/>
           <a:stretch>
             <a:fillRect/>
           </a:stretch>
@@ -6501,7 +6502,7 @@
       </p:sp>
       <p:pic>
         <p:nvPicPr>
-          <p:cNvPr id="4" name="Content Placeholder 3" descr="Project5.png"/>
+          <p:cNvPr id="5" name="Content Placeholder 4" descr="Project5.png"/>
           <p:cNvPicPr>
             <a:picLocks noGrp="1" noChangeAspect="1"/>
           </p:cNvPicPr>
@@ -6517,7 +6518,7 @@
               </a:ext>
             </a:extLst>
           </a:blip>
-          <a:srcRect l="-8069" r="-8069"/>
+          <a:srcRect l="-9809" r="-9809"/>
           <a:stretch>
             <a:fillRect/>
           </a:stretch>
@@ -6853,7 +6854,7 @@
       </p:sp>
       <p:pic>
         <p:nvPicPr>
-          <p:cNvPr id="4" name="Content Placeholder 3" descr="Project6.png"/>
+          <p:cNvPr id="5" name="Content Placeholder 4" descr="Project6.png"/>
           <p:cNvPicPr>
             <a:picLocks noGrp="1" noChangeAspect="1"/>
           </p:cNvPicPr>
@@ -6869,7 +6870,7 @@
               </a:ext>
             </a:extLst>
           </a:blip>
-          <a:srcRect l="-13297" r="-13297"/>
+          <a:srcRect l="-16148" r="-16148"/>
           <a:stretch>
             <a:fillRect/>
           </a:stretch>
@@ -7567,11 +7568,7 @@
             </a:r>
             <a:r>
               <a:rPr lang="en-US" dirty="0" smtClean="0"/>
-              <a:t> this is represented as +5V for 1 and 0V for 0. Presence or Absence </a:t>
-            </a:r>
-            <a:r>
-              <a:rPr lang="en-US" smtClean="0"/>
-              <a:t>of voltage.</a:t>
+              <a:t> this is represented as +5V for 1 and 0V for 0. Presence or Absence of voltage.</a:t>
             </a:r>
             <a:endParaRPr lang="en-US" dirty="0"/>
           </a:p>

</xml_diff>